<commit_message>
changing margins and padding
</commit_message>
<xml_diff>
--- a/Week-2-Presentation.pptx
+++ b/Week-2-Presentation.pptx
@@ -10,8 +10,9 @@
     <p:sldId id="258" r:id="rId4"/>
     <p:sldId id="259" r:id="rId5"/>
     <p:sldId id="260" r:id="rId6"/>
-    <p:sldId id="261" r:id="rId7"/>
-    <p:sldId id="262" r:id="rId8"/>
+    <p:sldId id="263" r:id="rId7"/>
+    <p:sldId id="261" r:id="rId8"/>
+    <p:sldId id="262" r:id="rId9"/>
   </p:sldIdLst>
   <p:sldSz cx="12192000" cy="6858000"/>
   <p:notesSz cx="6858000" cy="9144000"/>
@@ -3060,6 +3061,13 @@
   <p:clrMapOvr>
     <a:masterClrMapping/>
   </p:clrMapOvr>
+  <p:timing>
+    <p:tnLst>
+      <p:par>
+        <p:cTn id="1" dur="indefinite" restart="never" nodeType="tmRoot"/>
+      </p:par>
+    </p:tnLst>
+  </p:timing>
 </p:sld>
 </file>
 
@@ -3138,6 +3146,13 @@
   <p:clrMapOvr>
     <a:masterClrMapping/>
   </p:clrMapOvr>
+  <p:timing>
+    <p:tnLst>
+      <p:par>
+        <p:cTn id="1" dur="indefinite" restart="never" nodeType="tmRoot"/>
+      </p:par>
+    </p:tnLst>
+  </p:timing>
 </p:sld>
 </file>
 
@@ -3216,6 +3231,13 @@
   <p:clrMapOvr>
     <a:masterClrMapping/>
   </p:clrMapOvr>
+  <p:timing>
+    <p:tnLst>
+      <p:par>
+        <p:cTn id="1" dur="indefinite" restart="never" nodeType="tmRoot"/>
+      </p:par>
+    </p:tnLst>
+  </p:timing>
 </p:sld>
 </file>
 
@@ -3294,6 +3316,13 @@
   <p:clrMapOvr>
     <a:masterClrMapping/>
   </p:clrMapOvr>
+  <p:timing>
+    <p:tnLst>
+      <p:par>
+        <p:cTn id="1" dur="indefinite" restart="never" nodeType="tmRoot"/>
+      </p:par>
+    </p:tnLst>
+  </p:timing>
 </p:sld>
 </file>
 
@@ -3372,10 +3401,102 @@
   <p:clrMapOvr>
     <a:masterClrMapping/>
   </p:clrMapOvr>
+  <p:timing>
+    <p:tnLst>
+      <p:par>
+        <p:cTn id="1" dur="indefinite" restart="never" nodeType="tmRoot"/>
+      </p:par>
+    </p:tnLst>
+  </p:timing>
 </p:sld>
 </file>
 
 <file path=ppt/slides/slide6.xml><?xml version="1.0" encoding="utf-8"?>
+<p:sld xmlns:a="http://schemas.openxmlformats.org/drawingml/2006/main" xmlns:r="http://schemas.openxmlformats.org/officeDocument/2006/relationships" xmlns:p="http://schemas.openxmlformats.org/presentationml/2006/main">
+  <p:cSld>
+    <p:spTree>
+      <p:nvGrpSpPr>
+        <p:cNvPr id="1" name=""/>
+        <p:cNvGrpSpPr/>
+        <p:nvPr/>
+      </p:nvGrpSpPr>
+      <p:grpSpPr>
+        <a:xfrm>
+          <a:off x="0" y="0"/>
+          <a:ext cx="0" cy="0"/>
+          <a:chOff x="0" y="0"/>
+          <a:chExt cx="0" cy="0"/>
+        </a:xfrm>
+      </p:grpSpPr>
+      <p:sp>
+        <p:nvSpPr>
+          <p:cNvPr id="2" name="Title 1"/>
+          <p:cNvSpPr>
+            <a:spLocks noGrp="1"/>
+          </p:cNvSpPr>
+          <p:nvPr>
+            <p:ph type="title"/>
+          </p:nvPr>
+        </p:nvSpPr>
+        <p:spPr/>
+        <p:txBody>
+          <a:bodyPr/>
+          <a:lstStyle/>
+          <a:p>
+            <a:endParaRPr lang="en-US"/>
+          </a:p>
+        </p:txBody>
+      </p:sp>
+      <p:pic>
+        <p:nvPicPr>
+          <p:cNvPr id="5" name="Content Placeholder 4"/>
+          <p:cNvPicPr>
+            <a:picLocks noGrp="1" noChangeAspect="1"/>
+          </p:cNvPicPr>
+          <p:nvPr>
+            <p:ph idx="1"/>
+          </p:nvPr>
+        </p:nvPicPr>
+        <p:blipFill>
+          <a:blip r:embed="rId2">
+            <a:extLst>
+              <a:ext uri="{28A0092B-C50C-407E-A947-70E740481C1C}">
+                <a14:useLocalDpi xmlns:a14="http://schemas.microsoft.com/office/drawing/2010/main" val="0"/>
+              </a:ext>
+            </a:extLst>
+          </a:blip>
+          <a:stretch>
+            <a:fillRect/>
+          </a:stretch>
+        </p:blipFill>
+        <p:spPr>
+          <a:xfrm>
+            <a:off x="198138" y="617517"/>
+            <a:ext cx="11463432" cy="5158544"/>
+          </a:xfrm>
+        </p:spPr>
+      </p:pic>
+    </p:spTree>
+    <p:extLst>
+      <p:ext uri="{BB962C8B-B14F-4D97-AF65-F5344CB8AC3E}">
+        <p14:creationId xmlns:p14="http://schemas.microsoft.com/office/powerpoint/2010/main" val="937141860"/>
+      </p:ext>
+    </p:extLst>
+  </p:cSld>
+  <p:clrMapOvr>
+    <a:masterClrMapping/>
+  </p:clrMapOvr>
+  <p:timing>
+    <p:tnLst>
+      <p:par>
+        <p:cTn id="1" dur="indefinite" restart="never" nodeType="tmRoot"/>
+      </p:par>
+    </p:tnLst>
+  </p:timing>
+</p:sld>
+</file>
+
+<file path=ppt/slides/slide7.xml><?xml version="1.0" encoding="utf-8"?>
 <p:sld xmlns:a="http://schemas.openxmlformats.org/drawingml/2006/main" xmlns:r="http://schemas.openxmlformats.org/officeDocument/2006/relationships" xmlns:p="http://schemas.openxmlformats.org/presentationml/2006/main">
   <p:cSld>
     <p:spTree>
@@ -3450,10 +3571,17 @@
   <p:clrMapOvr>
     <a:masterClrMapping/>
   </p:clrMapOvr>
+  <p:timing>
+    <p:tnLst>
+      <p:par>
+        <p:cTn id="1" dur="indefinite" restart="never" nodeType="tmRoot"/>
+      </p:par>
+    </p:tnLst>
+  </p:timing>
 </p:sld>
 </file>
 
-<file path=ppt/slides/slide7.xml><?xml version="1.0" encoding="utf-8"?>
+<file path=ppt/slides/slide8.xml><?xml version="1.0" encoding="utf-8"?>
 <p:sld xmlns:a="http://schemas.openxmlformats.org/drawingml/2006/main" xmlns:r="http://schemas.openxmlformats.org/officeDocument/2006/relationships" xmlns:p="http://schemas.openxmlformats.org/presentationml/2006/main">
   <p:cSld>
     <p:spTree>
@@ -3513,8 +3641,8 @@
         </p:blipFill>
         <p:spPr>
           <a:xfrm>
-            <a:off x="-673396" y="365125"/>
-            <a:ext cx="12369194" cy="5676405"/>
+            <a:off x="0" y="674156"/>
+            <a:ext cx="11695798" cy="5367374"/>
           </a:xfrm>
         </p:spPr>
       </p:pic>
@@ -3528,6 +3656,13 @@
   <p:clrMapOvr>
     <a:masterClrMapping/>
   </p:clrMapOvr>
+  <p:timing>
+    <p:tnLst>
+      <p:par>
+        <p:cTn id="1" dur="indefinite" restart="never" nodeType="tmRoot"/>
+      </p:par>
+    </p:tnLst>
+  </p:timing>
 </p:sld>
 </file>
 

</xml_diff>